<commit_message>
tdk ppt diagramm javitas
</commit_message>
<xml_diff>
--- a/tdk/CzotterBenedek_TDK_javitott.pptx
+++ b/tdk/CzotterBenedek_TDK_javitott.pptx
@@ -218,7 +218,7 @@
           <a:p>
             <a:fld id="{0AB5BC8E-5813-4F4E-B35B-0E3B0D0BF7D5}" type="datetimeFigureOut">
               <a:rPr lang="hu-HU" smtClean="0"/>
-              <a:t>2025. 11. 11.</a:t>
+              <a:t>2025. 11. 12.</a:t>
             </a:fld>
             <a:endParaRPr lang="hu-HU"/>
           </a:p>
@@ -1531,11 +1531,8 @@
             </a:r>
             <a:r>
               <a:rPr lang="hu-HU" dirty="0"/>
-              <a:t> tekintetében.</a:t>
-            </a:r>
-          </a:p>
-          <a:p>
-            <a:endParaRPr lang="hu-HU" dirty="0"/>
+              <a:t> tekintetében. </a:t>
+            </a:r>
           </a:p>
           <a:p>
             <a:r>
@@ -1548,13 +1545,8 @@
             </a:r>
             <a:r>
               <a:rPr lang="hu-HU" dirty="0"/>
-              <a:t> számának függvényében látható </a:t>
-            </a:r>
-            <a:r>
-              <a:rPr lang="hu-HU"/>
-              <a:t>a pontosság.</a:t>
-            </a:r>
-            <a:endParaRPr lang="hu-HU" dirty="0"/>
+              <a:t> számának függvényében látható a pontosság.</a:t>
+            </a:r>
           </a:p>
           <a:p>
             <a:endParaRPr lang="hu-HU" dirty="0"/>
@@ -4436,7 +4428,7 @@
           <a:p>
             <a:fld id="{D45F21B2-F76C-DA4E-93C7-1ED776993694}" type="datetime1">
               <a:rPr lang="hu-HU" smtClean="0"/>
-              <a:t>2025. 11. 11.</a:t>
+              <a:t>2025. 11. 12.</a:t>
             </a:fld>
             <a:endParaRPr lang="hu-HU"/>
           </a:p>
@@ -4637,7 +4629,7 @@
           <a:p>
             <a:fld id="{639F617D-633B-144B-B338-1A3186D94DEC}" type="datetime1">
               <a:rPr lang="hu-HU" smtClean="0"/>
-              <a:t>2025. 11. 11.</a:t>
+              <a:t>2025. 11. 12.</a:t>
             </a:fld>
             <a:endParaRPr lang="hu-HU"/>
           </a:p>
@@ -4845,7 +4837,7 @@
           <a:p>
             <a:fld id="{EB40C74A-E794-5D4C-99F0-E0908F250C85}" type="datetime1">
               <a:rPr lang="hu-HU" smtClean="0"/>
-              <a:t>2025. 11. 11.</a:t>
+              <a:t>2025. 11. 12.</a:t>
             </a:fld>
             <a:endParaRPr lang="hu-HU"/>
           </a:p>
@@ -5043,7 +5035,7 @@
           <a:p>
             <a:fld id="{FB2979DB-241A-8544-95D6-5A5515E861C2}" type="datetime1">
               <a:rPr lang="hu-HU" smtClean="0"/>
-              <a:t>2025. 11. 11.</a:t>
+              <a:t>2025. 11. 12.</a:t>
             </a:fld>
             <a:endParaRPr lang="hu-HU"/>
           </a:p>
@@ -5318,7 +5310,7 @@
           <a:p>
             <a:fld id="{E1238A03-143C-DC48-B6FB-03520BF3D264}" type="datetime1">
               <a:rPr lang="hu-HU" smtClean="0"/>
-              <a:t>2025. 11. 11.</a:t>
+              <a:t>2025. 11. 12.</a:t>
             </a:fld>
             <a:endParaRPr lang="hu-HU"/>
           </a:p>
@@ -5583,7 +5575,7 @@
           <a:p>
             <a:fld id="{32D5DABD-02F3-C24D-B459-BA5A52C7C0D3}" type="datetime1">
               <a:rPr lang="hu-HU" smtClean="0"/>
-              <a:t>2025. 11. 11.</a:t>
+              <a:t>2025. 11. 12.</a:t>
             </a:fld>
             <a:endParaRPr lang="hu-HU"/>
           </a:p>
@@ -5995,7 +5987,7 @@
           <a:p>
             <a:fld id="{B8F665F1-11A6-C146-8C9C-4EAD2B21F502}" type="datetime1">
               <a:rPr lang="hu-HU" smtClean="0"/>
-              <a:t>2025. 11. 11.</a:t>
+              <a:t>2025. 11. 12.</a:t>
             </a:fld>
             <a:endParaRPr lang="hu-HU"/>
           </a:p>
@@ -6136,7 +6128,7 @@
           <a:p>
             <a:fld id="{0505F671-323E-D34A-8D4F-5155E3541BC7}" type="datetime1">
               <a:rPr lang="hu-HU" smtClean="0"/>
-              <a:t>2025. 11. 11.</a:t>
+              <a:t>2025. 11. 12.</a:t>
             </a:fld>
             <a:endParaRPr lang="hu-HU"/>
           </a:p>
@@ -6249,7 +6241,7 @@
           <a:p>
             <a:fld id="{B3CDB417-D9D9-C740-B221-44D378005732}" type="datetime1">
               <a:rPr lang="hu-HU" smtClean="0"/>
-              <a:t>2025. 11. 11.</a:t>
+              <a:t>2025. 11. 12.</a:t>
             </a:fld>
             <a:endParaRPr lang="hu-HU"/>
           </a:p>
@@ -6560,7 +6552,7 @@
           <a:p>
             <a:fld id="{3980F3EA-3925-E241-9F9A-1E3EF43D2F81}" type="datetime1">
               <a:rPr lang="hu-HU" smtClean="0"/>
-              <a:t>2025. 11. 11.</a:t>
+              <a:t>2025. 11. 12.</a:t>
             </a:fld>
             <a:endParaRPr lang="hu-HU"/>
           </a:p>
@@ -6848,7 +6840,7 @@
           <a:p>
             <a:fld id="{662B74F7-95E0-1C4A-BBFA-D3DEF04605D4}" type="datetime1">
               <a:rPr lang="hu-HU" smtClean="0"/>
-              <a:t>2025. 11. 11.</a:t>
+              <a:t>2025. 11. 12.</a:t>
             </a:fld>
             <a:endParaRPr lang="hu-HU"/>
           </a:p>
@@ -7089,7 +7081,7 @@
           <a:p>
             <a:fld id="{E04DB062-3C69-2A49-980E-3FE962CDF110}" type="datetime1">
               <a:rPr lang="hu-HU" smtClean="0"/>
-              <a:t>2025. 11. 11.</a:t>
+              <a:t>2025. 11. 12.</a:t>
             </a:fld>
             <a:endParaRPr lang="hu-HU" dirty="0"/>
           </a:p>
@@ -8106,7 +8098,7 @@
           <a:p>
             <a:fld id="{16CFAA20-991C-5440-821D-EF7936105166}" type="datetime1">
               <a:rPr lang="hu-HU" smtClean="0"/>
-              <a:t>2025. 11. 11.</a:t>
+              <a:t>2025. 11. 12.</a:t>
             </a:fld>
             <a:endParaRPr lang="hu-HU"/>
           </a:p>
@@ -8232,7 +8224,7 @@
           <a:p>
             <a:fld id="{031D0D19-1B35-7A4F-93B5-1EDA6F972E33}" type="datetime1">
               <a:rPr lang="hu-HU" smtClean="0"/>
-              <a:t>2025. 11. 11.</a:t>
+              <a:t>2025. 11. 12.</a:t>
             </a:fld>
             <a:endParaRPr lang="hu-HU"/>
           </a:p>
@@ -8272,10 +8264,10 @@
       </p:sp>
       <p:pic>
         <p:nvPicPr>
-          <p:cNvPr id="7" name="Kép 6" descr="A képen szöveg, sor, Diagram, képernyőkép látható&#10;&#10;Automatikusan generált leírás">
-            <a:extLst>
-              <a:ext uri="{FF2B5EF4-FFF2-40B4-BE49-F238E27FC236}">
-                <a16:creationId xmlns:a16="http://schemas.microsoft.com/office/drawing/2014/main" id="{32F4C2EF-A4A6-70CE-FA21-7ED1ED5D5BB8}"/>
+          <p:cNvPr id="6" name="Kép 5" descr="A képen szöveg, sor, Diagram, képernyőkép látható&#10;&#10;Automatikusan generált leírás">
+            <a:extLst>
+              <a:ext uri="{FF2B5EF4-FFF2-40B4-BE49-F238E27FC236}">
+                <a16:creationId xmlns:a16="http://schemas.microsoft.com/office/drawing/2014/main" id="{6DA06527-DE02-E4A8-3B3B-8DCE7840F88E}"/>
               </a:ext>
             </a:extLst>
           </p:cNvPr>
@@ -8298,8 +8290,8 @@
         </p:blipFill>
         <p:spPr>
           <a:xfrm>
-            <a:off x="200096" y="1250302"/>
-            <a:ext cx="11791807" cy="4671050"/>
+            <a:off x="500735" y="1458646"/>
+            <a:ext cx="11190529" cy="4432868"/>
           </a:xfrm>
           <a:prstGeom prst="rect">
             <a:avLst/>
@@ -8308,10 +8300,10 @@
       </p:pic>
       <p:pic>
         <p:nvPicPr>
-          <p:cNvPr id="10" name="Kép 9" descr="A képen sor, képernyőkép, szöveg, Diagram látható&#10;&#10;Automatikusan generált leírás">
-            <a:extLst>
-              <a:ext uri="{FF2B5EF4-FFF2-40B4-BE49-F238E27FC236}">
-                <a16:creationId xmlns:a16="http://schemas.microsoft.com/office/drawing/2014/main" id="{8D0FB769-5BA3-4D84-4F87-8709619E11EE}"/>
+          <p:cNvPr id="9" name="Kép 8" descr="A képen szöveg, sor, képernyőkép, Diagram látható&#10;&#10;Automatikusan generált leírás">
+            <a:extLst>
+              <a:ext uri="{FF2B5EF4-FFF2-40B4-BE49-F238E27FC236}">
+                <a16:creationId xmlns:a16="http://schemas.microsoft.com/office/drawing/2014/main" id="{9C5DC3D4-9239-082D-165B-45262CC053E5}"/>
               </a:ext>
             </a:extLst>
           </p:cNvPr>
@@ -8334,8 +8326,8 @@
         </p:blipFill>
         <p:spPr>
           <a:xfrm>
-            <a:off x="200096" y="1249427"/>
-            <a:ext cx="11796224" cy="4672800"/>
+            <a:off x="500735" y="1459914"/>
+            <a:ext cx="11187328" cy="4431600"/>
           </a:xfrm>
           <a:prstGeom prst="rect">
             <a:avLst/>
@@ -8346,6 +8338,918 @@
     <p:extLst>
       <p:ext uri="{BB962C8B-B14F-4D97-AF65-F5344CB8AC3E}">
         <p14:creationId xmlns:p14="http://schemas.microsoft.com/office/powerpoint/2010/main" val="2878426958"/>
+      </p:ext>
+    </p:extLst>
+  </p:cSld>
+  <p:clrMapOvr>
+    <a:masterClrMapping/>
+  </p:clrMapOvr>
+  <p:timing>
+    <p:tnLst>
+      <p:par>
+        <p:cTn id="1" dur="indefinite" restart="never" nodeType="tmRoot">
+          <p:childTnLst>
+            <p:seq concurrent="1" nextAc="seek">
+              <p:cTn id="2" dur="indefinite" nodeType="mainSeq">
+                <p:childTnLst>
+                  <p:par>
+                    <p:cTn id="3" fill="hold">
+                      <p:stCondLst>
+                        <p:cond delay="indefinite"/>
+                      </p:stCondLst>
+                      <p:childTnLst>
+                        <p:par>
+                          <p:cTn id="4" fill="hold">
+                            <p:stCondLst>
+                              <p:cond delay="0"/>
+                            </p:stCondLst>
+                            <p:childTnLst>
+                              <p:par>
+                                <p:cTn id="5" presetID="1" presetClass="entr" presetSubtype="0" fill="hold" nodeType="clickEffect">
+                                  <p:stCondLst>
+                                    <p:cond delay="0"/>
+                                  </p:stCondLst>
+                                  <p:childTnLst>
+                                    <p:set>
+                                      <p:cBhvr>
+                                        <p:cTn id="6" dur="1" fill="hold">
+                                          <p:stCondLst>
+                                            <p:cond delay="0"/>
+                                          </p:stCondLst>
+                                        </p:cTn>
+                                        <p:tgtEl>
+                                          <p:spTgt spid="9"/>
+                                        </p:tgtEl>
+                                        <p:attrNameLst>
+                                          <p:attrName>style.visibility</p:attrName>
+                                        </p:attrNameLst>
+                                      </p:cBhvr>
+                                      <p:to>
+                                        <p:strVal val="visible"/>
+                                      </p:to>
+                                    </p:set>
+                                  </p:childTnLst>
+                                </p:cTn>
+                              </p:par>
+                            </p:childTnLst>
+                          </p:cTn>
+                        </p:par>
+                      </p:childTnLst>
+                    </p:cTn>
+                  </p:par>
+                </p:childTnLst>
+              </p:cTn>
+              <p:prevCondLst>
+                <p:cond evt="onPrev" delay="0">
+                  <p:tgtEl>
+                    <p:sldTgt/>
+                  </p:tgtEl>
+                </p:cond>
+              </p:prevCondLst>
+              <p:nextCondLst>
+                <p:cond evt="onNext" delay="0">
+                  <p:tgtEl>
+                    <p:sldTgt/>
+                  </p:tgtEl>
+                </p:cond>
+              </p:nextCondLst>
+            </p:seq>
+          </p:childTnLst>
+        </p:cTn>
+      </p:par>
+    </p:tnLst>
+  </p:timing>
+</p:sld>
+</file>
+
+<file path=ppt/slides/slide12.xml><?xml version="1.0" encoding="utf-8"?>
+<p:sld xmlns:a="http://schemas.openxmlformats.org/drawingml/2006/main" xmlns:r="http://schemas.openxmlformats.org/officeDocument/2006/relationships" xmlns:p="http://schemas.openxmlformats.org/presentationml/2006/main">
+  <p:cSld>
+    <p:spTree>
+      <p:nvGrpSpPr>
+        <p:cNvPr id="1" name=""/>
+        <p:cNvGrpSpPr/>
+        <p:nvPr/>
+      </p:nvGrpSpPr>
+      <p:grpSpPr>
+        <a:xfrm>
+          <a:off x="0" y="0"/>
+          <a:ext cx="0" cy="0"/>
+          <a:chOff x="0" y="0"/>
+          <a:chExt cx="0" cy="0"/>
+        </a:xfrm>
+      </p:grpSpPr>
+      <p:sp>
+        <p:nvSpPr>
+          <p:cNvPr id="2" name="Cím 1">
+            <a:extLst>
+              <a:ext uri="{FF2B5EF4-FFF2-40B4-BE49-F238E27FC236}">
+                <a16:creationId xmlns:a16="http://schemas.microsoft.com/office/drawing/2014/main" id="{A18C4855-CAF2-5DD9-532A-7A0D88048004}"/>
+              </a:ext>
+            </a:extLst>
+          </p:cNvPr>
+          <p:cNvSpPr>
+            <a:spLocks noGrp="1"/>
+          </p:cNvSpPr>
+          <p:nvPr>
+            <p:ph type="title"/>
+          </p:nvPr>
+        </p:nvSpPr>
+        <p:spPr/>
+        <p:txBody>
+          <a:bodyPr/>
+          <a:lstStyle/>
+          <a:p>
+            <a:r>
+              <a:rPr lang="hu-HU" b="1" dirty="0" err="1"/>
+              <a:t>Klaszterezési</a:t>
+            </a:r>
+            <a:r>
+              <a:rPr lang="hu-HU" b="1" dirty="0"/>
+              <a:t> algoritmusok pontossága</a:t>
+            </a:r>
+            <a:endParaRPr lang="hu-HU" dirty="0"/>
+          </a:p>
+        </p:txBody>
+      </p:sp>
+      <p:sp>
+        <p:nvSpPr>
+          <p:cNvPr id="3" name="Tartalom helye 2">
+            <a:extLst>
+              <a:ext uri="{FF2B5EF4-FFF2-40B4-BE49-F238E27FC236}">
+                <a16:creationId xmlns:a16="http://schemas.microsoft.com/office/drawing/2014/main" id="{DB538570-B920-9406-9988-BB1C0443BDB0}"/>
+              </a:ext>
+            </a:extLst>
+          </p:cNvPr>
+          <p:cNvSpPr>
+            <a:spLocks noGrp="1"/>
+          </p:cNvSpPr>
+          <p:nvPr>
+            <p:ph idx="1"/>
+          </p:nvPr>
+        </p:nvSpPr>
+        <p:spPr/>
+        <p:txBody>
+          <a:bodyPr/>
+          <a:lstStyle/>
+          <a:p>
+            <a:r>
+              <a:rPr lang="hu-HU" dirty="0"/>
+              <a:t>Pontossági mérés beállításai:</a:t>
+            </a:r>
+          </a:p>
+          <a:p>
+            <a:pPr lvl="1"/>
+            <a:r>
+              <a:rPr lang="hu-HU" dirty="0"/>
+              <a:t>Szintetikus adathalmaz:</a:t>
+            </a:r>
+          </a:p>
+          <a:p>
+            <a:pPr lvl="2"/>
+            <a:r>
+              <a:rPr lang="hu-HU" dirty="0"/>
+              <a:t>500 dimenziós vektorok</a:t>
+            </a:r>
+          </a:p>
+          <a:p>
+            <a:pPr lvl="2"/>
+            <a:r>
+              <a:rPr lang="hu-HU" dirty="0"/>
+              <a:t>10.000 adatpont</a:t>
+            </a:r>
+          </a:p>
+          <a:p>
+            <a:pPr lvl="2"/>
+            <a:r>
+              <a:rPr lang="hu-HU" dirty="0"/>
+              <a:t>200, 300, 400, 500, 800 klaszter</a:t>
+            </a:r>
+          </a:p>
+          <a:p>
+            <a:pPr lvl="2"/>
+            <a:r>
+              <a:rPr lang="hu-HU" dirty="0"/>
+              <a:t>Minden klaszterszámra </a:t>
+            </a:r>
+            <a:r>
+              <a:rPr lang="el-GR" dirty="0">
+                <a:solidFill>
+                  <a:srgbClr val="000000"/>
+                </a:solidFill>
+                <a:effectLst/>
+                <a:latin typeface="Times New Roman" panose="02020603050405020304" pitchFamily="18" charset="0"/>
+              </a:rPr>
+              <a:t>σ = 2,</a:t>
+            </a:r>
+            <a:r>
+              <a:rPr lang="hu-HU" dirty="0">
+                <a:solidFill>
+                  <a:srgbClr val="000000"/>
+                </a:solidFill>
+                <a:effectLst/>
+                <a:latin typeface="Times New Roman" panose="02020603050405020304" pitchFamily="18" charset="0"/>
+              </a:rPr>
+              <a:t> </a:t>
+            </a:r>
+            <a:r>
+              <a:rPr lang="el-GR" dirty="0">
+                <a:solidFill>
+                  <a:srgbClr val="000000"/>
+                </a:solidFill>
+                <a:effectLst/>
+                <a:latin typeface="Times New Roman" panose="02020603050405020304" pitchFamily="18" charset="0"/>
+              </a:rPr>
+              <a:t>4, 6, 8 </a:t>
+            </a:r>
+            <a:r>
+              <a:rPr lang="hu-HU" dirty="0">
+                <a:solidFill>
+                  <a:srgbClr val="000000"/>
+                </a:solidFill>
+                <a:effectLst/>
+                <a:latin typeface="Times New Roman" panose="02020603050405020304" pitchFamily="18" charset="0"/>
+              </a:rPr>
+              <a:t>és 10 szórással</a:t>
+            </a:r>
+            <a:endParaRPr lang="hu-HU" dirty="0"/>
+          </a:p>
+          <a:p>
+            <a:pPr lvl="2"/>
+            <a:endParaRPr lang="hu-HU" dirty="0"/>
+          </a:p>
+        </p:txBody>
+      </p:sp>
+      <p:sp>
+        <p:nvSpPr>
+          <p:cNvPr id="4" name="Dátum helye 3">
+            <a:extLst>
+              <a:ext uri="{FF2B5EF4-FFF2-40B4-BE49-F238E27FC236}">
+                <a16:creationId xmlns:a16="http://schemas.microsoft.com/office/drawing/2014/main" id="{97B084F8-7887-3ADC-D4D8-A26425144373}"/>
+              </a:ext>
+            </a:extLst>
+          </p:cNvPr>
+          <p:cNvSpPr>
+            <a:spLocks noGrp="1"/>
+          </p:cNvSpPr>
+          <p:nvPr>
+            <p:ph type="dt" sz="half" idx="10"/>
+          </p:nvPr>
+        </p:nvSpPr>
+        <p:spPr/>
+        <p:txBody>
+          <a:bodyPr/>
+          <a:lstStyle/>
+          <a:p>
+            <a:fld id="{F5CF19C3-C554-0D49-858F-BC5A4F8BAF23}" type="datetime1">
+              <a:rPr lang="hu-HU" smtClean="0"/>
+              <a:t>2025. 11. 12.</a:t>
+            </a:fld>
+            <a:endParaRPr lang="hu-HU"/>
+          </a:p>
+        </p:txBody>
+      </p:sp>
+      <p:sp>
+        <p:nvSpPr>
+          <p:cNvPr id="5" name="Dia számának helye 4">
+            <a:extLst>
+              <a:ext uri="{FF2B5EF4-FFF2-40B4-BE49-F238E27FC236}">
+                <a16:creationId xmlns:a16="http://schemas.microsoft.com/office/drawing/2014/main" id="{C49B74D0-CF8E-A658-AA33-4DF54D917350}"/>
+              </a:ext>
+            </a:extLst>
+          </p:cNvPr>
+          <p:cNvSpPr>
+            <a:spLocks noGrp="1"/>
+          </p:cNvSpPr>
+          <p:nvPr>
+            <p:ph type="sldNum" sz="quarter" idx="12"/>
+          </p:nvPr>
+        </p:nvSpPr>
+        <p:spPr/>
+        <p:txBody>
+          <a:bodyPr/>
+          <a:lstStyle/>
+          <a:p>
+            <a:fld id="{61F88ADF-3301-4598-B089-C6A4CC92BE83}" type="slidenum">
+              <a:rPr lang="hu-HU" smtClean="0"/>
+              <a:t>12</a:t>
+            </a:fld>
+            <a:r>
+              <a:rPr lang="hu-HU" dirty="0"/>
+              <a:t>/22</a:t>
+            </a:r>
+          </a:p>
+        </p:txBody>
+      </p:sp>
+    </p:spTree>
+    <p:extLst>
+      <p:ext uri="{BB962C8B-B14F-4D97-AF65-F5344CB8AC3E}">
+        <p14:creationId xmlns:p14="http://schemas.microsoft.com/office/powerpoint/2010/main" val="1625220533"/>
+      </p:ext>
+    </p:extLst>
+  </p:cSld>
+  <p:clrMapOvr>
+    <a:masterClrMapping/>
+  </p:clrMapOvr>
+</p:sld>
+</file>
+
+<file path=ppt/slides/slide13.xml><?xml version="1.0" encoding="utf-8"?>
+<p:sld xmlns:a="http://schemas.openxmlformats.org/drawingml/2006/main" xmlns:r="http://schemas.openxmlformats.org/officeDocument/2006/relationships" xmlns:p="http://schemas.openxmlformats.org/presentationml/2006/main">
+  <p:cSld>
+    <p:spTree>
+      <p:nvGrpSpPr>
+        <p:cNvPr id="1" name=""/>
+        <p:cNvGrpSpPr/>
+        <p:nvPr/>
+      </p:nvGrpSpPr>
+      <p:grpSpPr>
+        <a:xfrm>
+          <a:off x="0" y="0"/>
+          <a:ext cx="0" cy="0"/>
+          <a:chOff x="0" y="0"/>
+          <a:chExt cx="0" cy="0"/>
+        </a:xfrm>
+      </p:grpSpPr>
+      <p:sp>
+        <p:nvSpPr>
+          <p:cNvPr id="2" name="Cím 1">
+            <a:extLst>
+              <a:ext uri="{FF2B5EF4-FFF2-40B4-BE49-F238E27FC236}">
+                <a16:creationId xmlns:a16="http://schemas.microsoft.com/office/drawing/2014/main" id="{55C9B2F7-33BF-5C12-61DB-2CD68A814566}"/>
+              </a:ext>
+            </a:extLst>
+          </p:cNvPr>
+          <p:cNvSpPr>
+            <a:spLocks noGrp="1"/>
+          </p:cNvSpPr>
+          <p:nvPr>
+            <p:ph type="title"/>
+          </p:nvPr>
+        </p:nvSpPr>
+        <p:spPr/>
+        <p:txBody>
+          <a:bodyPr/>
+          <a:lstStyle/>
+          <a:p>
+            <a:r>
+              <a:rPr lang="hu-HU" b="1" dirty="0"/>
+              <a:t>Pontossági eredmények (ARI és NMI)</a:t>
+            </a:r>
+          </a:p>
+        </p:txBody>
+      </p:sp>
+      <p:sp>
+        <p:nvSpPr>
+          <p:cNvPr id="4" name="Dátum helye 3">
+            <a:extLst>
+              <a:ext uri="{FF2B5EF4-FFF2-40B4-BE49-F238E27FC236}">
+                <a16:creationId xmlns:a16="http://schemas.microsoft.com/office/drawing/2014/main" id="{C638CB8B-7386-89C9-3034-99523D920BE2}"/>
+              </a:ext>
+            </a:extLst>
+          </p:cNvPr>
+          <p:cNvSpPr>
+            <a:spLocks noGrp="1"/>
+          </p:cNvSpPr>
+          <p:nvPr>
+            <p:ph type="dt" sz="half" idx="10"/>
+          </p:nvPr>
+        </p:nvSpPr>
+        <p:spPr/>
+        <p:txBody>
+          <a:bodyPr/>
+          <a:lstStyle/>
+          <a:p>
+            <a:fld id="{86D7C4ED-070D-D147-BEC5-7EAE588D72B2}" type="datetime1">
+              <a:rPr lang="hu-HU" smtClean="0"/>
+              <a:t>2025. 11. 12.</a:t>
+            </a:fld>
+            <a:endParaRPr lang="hu-HU"/>
+          </a:p>
+        </p:txBody>
+      </p:sp>
+      <p:sp>
+        <p:nvSpPr>
+          <p:cNvPr id="5" name="Dia számának helye 4">
+            <a:extLst>
+              <a:ext uri="{FF2B5EF4-FFF2-40B4-BE49-F238E27FC236}">
+                <a16:creationId xmlns:a16="http://schemas.microsoft.com/office/drawing/2014/main" id="{E8C09457-CD5D-D0C2-3D41-F3729923EA9F}"/>
+              </a:ext>
+            </a:extLst>
+          </p:cNvPr>
+          <p:cNvSpPr>
+            <a:spLocks noGrp="1"/>
+          </p:cNvSpPr>
+          <p:nvPr>
+            <p:ph type="sldNum" sz="quarter" idx="12"/>
+          </p:nvPr>
+        </p:nvSpPr>
+        <p:spPr/>
+        <p:txBody>
+          <a:bodyPr/>
+          <a:lstStyle/>
+          <a:p>
+            <a:fld id="{61F88ADF-3301-4598-B089-C6A4CC92BE83}" type="slidenum">
+              <a:rPr lang="hu-HU" smtClean="0"/>
+              <a:t>13</a:t>
+            </a:fld>
+            <a:r>
+              <a:rPr lang="hu-HU" dirty="0"/>
+              <a:t>/22</a:t>
+            </a:r>
+          </a:p>
+        </p:txBody>
+      </p:sp>
+      <p:pic>
+        <p:nvPicPr>
+          <p:cNvPr id="11" name="Tartalom helye 10">
+            <a:extLst>
+              <a:ext uri="{FF2B5EF4-FFF2-40B4-BE49-F238E27FC236}">
+                <a16:creationId xmlns:a16="http://schemas.microsoft.com/office/drawing/2014/main" id="{5F12DD7E-7C79-6A85-74B8-A3082BAE07F6}"/>
+              </a:ext>
+            </a:extLst>
+          </p:cNvPr>
+          <p:cNvPicPr>
+            <a:picLocks noGrp="1" noChangeAspect="1"/>
+          </p:cNvPicPr>
+          <p:nvPr>
+            <p:ph idx="1"/>
+          </p:nvPr>
+        </p:nvPicPr>
+        <p:blipFill>
+          <a:blip r:embed="rId3">
+            <a:extLst>
+              <a:ext uri="{28A0092B-C50C-407E-A947-70E740481C1C}">
+                <a14:useLocalDpi xmlns:a14="http://schemas.microsoft.com/office/drawing/2010/main" val="0"/>
+              </a:ext>
+            </a:extLst>
+          </a:blip>
+          <a:stretch>
+            <a:fillRect/>
+          </a:stretch>
+        </p:blipFill>
+        <p:spPr>
+          <a:xfrm>
+            <a:off x="1528665" y="1455477"/>
+            <a:ext cx="9134669" cy="4679006"/>
+          </a:xfrm>
+        </p:spPr>
+      </p:pic>
+    </p:spTree>
+    <p:extLst>
+      <p:ext uri="{BB962C8B-B14F-4D97-AF65-F5344CB8AC3E}">
+        <p14:creationId xmlns:p14="http://schemas.microsoft.com/office/powerpoint/2010/main" val="290535503"/>
+      </p:ext>
+    </p:extLst>
+  </p:cSld>
+  <p:clrMapOvr>
+    <a:masterClrMapping/>
+  </p:clrMapOvr>
+</p:sld>
+</file>
+
+<file path=ppt/slides/slide14.xml><?xml version="1.0" encoding="utf-8"?>
+<p:sld xmlns:a="http://schemas.openxmlformats.org/drawingml/2006/main" xmlns:r="http://schemas.openxmlformats.org/officeDocument/2006/relationships" xmlns:p="http://schemas.openxmlformats.org/presentationml/2006/main">
+  <p:cSld>
+    <p:spTree>
+      <p:nvGrpSpPr>
+        <p:cNvPr id="1" name=""/>
+        <p:cNvGrpSpPr/>
+        <p:nvPr/>
+      </p:nvGrpSpPr>
+      <p:grpSpPr>
+        <a:xfrm>
+          <a:off x="0" y="0"/>
+          <a:ext cx="0" cy="0"/>
+          <a:chOff x="0" y="0"/>
+          <a:chExt cx="0" cy="0"/>
+        </a:xfrm>
+      </p:grpSpPr>
+      <p:sp>
+        <p:nvSpPr>
+          <p:cNvPr id="2" name="Cím 1">
+            <a:extLst>
+              <a:ext uri="{FF2B5EF4-FFF2-40B4-BE49-F238E27FC236}">
+                <a16:creationId xmlns:a16="http://schemas.microsoft.com/office/drawing/2014/main" id="{B16C46A4-6D8D-D412-17FC-B034421735DF}"/>
+              </a:ext>
+            </a:extLst>
+          </p:cNvPr>
+          <p:cNvSpPr>
+            <a:spLocks noGrp="1"/>
+          </p:cNvSpPr>
+          <p:nvPr>
+            <p:ph type="title"/>
+          </p:nvPr>
+        </p:nvSpPr>
+        <p:spPr/>
+        <p:txBody>
+          <a:bodyPr>
+            <a:normAutofit/>
+          </a:bodyPr>
+          <a:lstStyle/>
+          <a:p>
+            <a:r>
+              <a:rPr lang="hu-HU" sz="4000" b="1" dirty="0"/>
+              <a:t>A visszakeresési folyamat (</a:t>
+            </a:r>
+            <a:r>
+              <a:rPr lang="hu-HU" sz="4000" b="1" dirty="0" err="1"/>
+              <a:t>retrieval</a:t>
+            </a:r>
+            <a:r>
+              <a:rPr lang="hu-HU" sz="4000" b="1" dirty="0"/>
+              <a:t> </a:t>
+            </a:r>
+            <a:r>
+              <a:rPr lang="hu-HU" sz="4000" b="1" dirty="0" err="1"/>
+              <a:t>pipeline</a:t>
+            </a:r>
+            <a:r>
+              <a:rPr lang="hu-HU" sz="4000" b="1" dirty="0"/>
+              <a:t>) kiértékelése</a:t>
+            </a:r>
+          </a:p>
+        </p:txBody>
+      </p:sp>
+      <p:sp>
+        <p:nvSpPr>
+          <p:cNvPr id="3" name="Tartalom helye 2">
+            <a:extLst>
+              <a:ext uri="{FF2B5EF4-FFF2-40B4-BE49-F238E27FC236}">
+                <a16:creationId xmlns:a16="http://schemas.microsoft.com/office/drawing/2014/main" id="{689235CC-06AC-C5E8-688B-C1936A5D3FD3}"/>
+              </a:ext>
+            </a:extLst>
+          </p:cNvPr>
+          <p:cNvSpPr>
+            <a:spLocks noGrp="1"/>
+          </p:cNvSpPr>
+          <p:nvPr>
+            <p:ph idx="1"/>
+          </p:nvPr>
+        </p:nvSpPr>
+        <p:spPr>
+          <a:xfrm>
+            <a:off x="838200" y="2141537"/>
+            <a:ext cx="10515600" cy="4351338"/>
+          </a:xfrm>
+        </p:spPr>
+        <p:txBody>
+          <a:bodyPr/>
+          <a:lstStyle/>
+          <a:p>
+            <a:r>
+              <a:rPr lang="hu-HU" dirty="0"/>
+              <a:t>A mérés beállításai:</a:t>
+            </a:r>
+          </a:p>
+          <a:p>
+            <a:pPr lvl="1"/>
+            <a:r>
+              <a:rPr lang="hu-HU" dirty="0"/>
+              <a:t>Cél: Minden </a:t>
+            </a:r>
+            <a:r>
+              <a:rPr lang="hu-HU" dirty="0" err="1"/>
+              <a:t>query-hez</a:t>
+            </a:r>
+            <a:r>
+              <a:rPr lang="hu-HU" dirty="0"/>
+              <a:t> (87.599) megtalálni a legrelevánsabb </a:t>
+            </a:r>
+            <a:r>
+              <a:rPr lang="hu-HU" dirty="0" err="1"/>
+              <a:t>embedding</a:t>
+            </a:r>
+            <a:r>
+              <a:rPr lang="hu-HU" dirty="0"/>
+              <a:t> vektort</a:t>
+            </a:r>
+          </a:p>
+          <a:p>
+            <a:pPr lvl="1"/>
+            <a:r>
+              <a:rPr lang="hu-HU" dirty="0"/>
+              <a:t>Kérdések 15%-ára nincs válasz</a:t>
+            </a:r>
+          </a:p>
+          <a:p>
+            <a:pPr lvl="1"/>
+            <a:r>
+              <a:rPr lang="hu-HU" dirty="0"/>
+              <a:t>Ha a hasonlóság kisebb, mint 0,6            Nincs válasz a kérdésre</a:t>
+            </a:r>
+          </a:p>
+        </p:txBody>
+      </p:sp>
+      <p:sp>
+        <p:nvSpPr>
+          <p:cNvPr id="4" name="Dátum helye 3">
+            <a:extLst>
+              <a:ext uri="{FF2B5EF4-FFF2-40B4-BE49-F238E27FC236}">
+                <a16:creationId xmlns:a16="http://schemas.microsoft.com/office/drawing/2014/main" id="{720F0211-477B-15E0-2EBF-2A47A202C6E1}"/>
+              </a:ext>
+            </a:extLst>
+          </p:cNvPr>
+          <p:cNvSpPr>
+            <a:spLocks noGrp="1"/>
+          </p:cNvSpPr>
+          <p:nvPr>
+            <p:ph type="dt" sz="half" idx="10"/>
+          </p:nvPr>
+        </p:nvSpPr>
+        <p:spPr/>
+        <p:txBody>
+          <a:bodyPr/>
+          <a:lstStyle/>
+          <a:p>
+            <a:fld id="{DB103250-059E-6C49-9AEC-D7E11F74EA17}" type="datetime1">
+              <a:rPr lang="hu-HU" smtClean="0"/>
+              <a:t>2025. 11. 12.</a:t>
+            </a:fld>
+            <a:endParaRPr lang="hu-HU"/>
+          </a:p>
+        </p:txBody>
+      </p:sp>
+      <p:sp>
+        <p:nvSpPr>
+          <p:cNvPr id="5" name="Dia számának helye 4">
+            <a:extLst>
+              <a:ext uri="{FF2B5EF4-FFF2-40B4-BE49-F238E27FC236}">
+                <a16:creationId xmlns:a16="http://schemas.microsoft.com/office/drawing/2014/main" id="{BB189B6E-7E3F-3280-6C58-EF7283E05090}"/>
+              </a:ext>
+            </a:extLst>
+          </p:cNvPr>
+          <p:cNvSpPr>
+            <a:spLocks noGrp="1"/>
+          </p:cNvSpPr>
+          <p:nvPr>
+            <p:ph type="sldNum" sz="quarter" idx="12"/>
+          </p:nvPr>
+        </p:nvSpPr>
+        <p:spPr/>
+        <p:txBody>
+          <a:bodyPr/>
+          <a:lstStyle/>
+          <a:p>
+            <a:fld id="{61F88ADF-3301-4598-B089-C6A4CC92BE83}" type="slidenum">
+              <a:rPr lang="hu-HU" smtClean="0"/>
+              <a:t>14</a:t>
+            </a:fld>
+            <a:r>
+              <a:rPr lang="hu-HU" dirty="0"/>
+              <a:t>/22</a:t>
+            </a:r>
+          </a:p>
+        </p:txBody>
+      </p:sp>
+      <p:pic>
+        <p:nvPicPr>
+          <p:cNvPr id="7" name="Ábra 6" descr="Jobbra mutató nyíl egyszínű kitöltéssel">
+            <a:extLst>
+              <a:ext uri="{FF2B5EF4-FFF2-40B4-BE49-F238E27FC236}">
+                <a16:creationId xmlns:a16="http://schemas.microsoft.com/office/drawing/2014/main" id="{7120109B-EAC2-F9F6-35EF-CAAE89E34173}"/>
+              </a:ext>
+            </a:extLst>
+          </p:cNvPr>
+          <p:cNvPicPr>
+            <a:picLocks noChangeAspect="1"/>
+          </p:cNvPicPr>
+          <p:nvPr/>
+        </p:nvPicPr>
+        <p:blipFill>
+          <a:blip r:embed="rId3">
+            <a:extLst>
+              <a:ext uri="{96DAC541-7B7A-43D3-8B79-37D633B846F1}">
+                <asvg:svgBlip xmlns:asvg="http://schemas.microsoft.com/office/drawing/2016/SVG/main" r:embed="rId4"/>
+              </a:ext>
+            </a:extLst>
+          </a:blip>
+          <a:stretch>
+            <a:fillRect/>
+          </a:stretch>
+        </p:blipFill>
+        <p:spPr>
+          <a:xfrm>
+            <a:off x="6096000" y="3652052"/>
+            <a:ext cx="467031" cy="511712"/>
+          </a:xfrm>
+          <a:prstGeom prst="rect">
+            <a:avLst/>
+          </a:prstGeom>
+        </p:spPr>
+      </p:pic>
+    </p:spTree>
+    <p:extLst>
+      <p:ext uri="{BB962C8B-B14F-4D97-AF65-F5344CB8AC3E}">
+        <p14:creationId xmlns:p14="http://schemas.microsoft.com/office/powerpoint/2010/main" val="2554584894"/>
+      </p:ext>
+    </p:extLst>
+  </p:cSld>
+  <p:clrMapOvr>
+    <a:masterClrMapping/>
+  </p:clrMapOvr>
+</p:sld>
+</file>
+
+<file path=ppt/slides/slide15.xml><?xml version="1.0" encoding="utf-8"?>
+<p:sld xmlns:a="http://schemas.openxmlformats.org/drawingml/2006/main" xmlns:r="http://schemas.openxmlformats.org/officeDocument/2006/relationships" xmlns:p="http://schemas.openxmlformats.org/presentationml/2006/main">
+  <p:cSld>
+    <p:spTree>
+      <p:nvGrpSpPr>
+        <p:cNvPr id="1" name=""/>
+        <p:cNvGrpSpPr/>
+        <p:nvPr/>
+      </p:nvGrpSpPr>
+      <p:grpSpPr>
+        <a:xfrm>
+          <a:off x="0" y="0"/>
+          <a:ext cx="0" cy="0"/>
+          <a:chOff x="0" y="0"/>
+          <a:chExt cx="0" cy="0"/>
+        </a:xfrm>
+      </p:grpSpPr>
+      <p:sp>
+        <p:nvSpPr>
+          <p:cNvPr id="2" name="Cím 1">
+            <a:extLst>
+              <a:ext uri="{FF2B5EF4-FFF2-40B4-BE49-F238E27FC236}">
+                <a16:creationId xmlns:a16="http://schemas.microsoft.com/office/drawing/2014/main" id="{8D9D9E66-EAAD-305B-FE2A-DC7CD4764041}"/>
+              </a:ext>
+            </a:extLst>
+          </p:cNvPr>
+          <p:cNvSpPr>
+            <a:spLocks noGrp="1"/>
+          </p:cNvSpPr>
+          <p:nvPr>
+            <p:ph type="title"/>
+          </p:nvPr>
+        </p:nvSpPr>
+        <p:spPr/>
+        <p:txBody>
+          <a:bodyPr>
+            <a:normAutofit/>
+          </a:bodyPr>
+          <a:lstStyle/>
+          <a:p>
+            <a:r>
+              <a:rPr lang="hu-HU" sz="4000" b="1" dirty="0"/>
+              <a:t>A visszakeresési folyamat (</a:t>
+            </a:r>
+            <a:r>
+              <a:rPr lang="hu-HU" sz="4000" b="1" dirty="0" err="1"/>
+              <a:t>retrieval</a:t>
+            </a:r>
+            <a:r>
+              <a:rPr lang="hu-HU" sz="4000" b="1" dirty="0"/>
+              <a:t> </a:t>
+            </a:r>
+            <a:r>
+              <a:rPr lang="hu-HU" sz="4000" b="1" dirty="0" err="1"/>
+              <a:t>pipeline</a:t>
+            </a:r>
+            <a:r>
+              <a:rPr lang="hu-HU" sz="4000" b="1" dirty="0"/>
+              <a:t>) kiértékelése</a:t>
+            </a:r>
+          </a:p>
+        </p:txBody>
+      </p:sp>
+      <p:sp>
+        <p:nvSpPr>
+          <p:cNvPr id="4" name="Dátum helye 3">
+            <a:extLst>
+              <a:ext uri="{FF2B5EF4-FFF2-40B4-BE49-F238E27FC236}">
+                <a16:creationId xmlns:a16="http://schemas.microsoft.com/office/drawing/2014/main" id="{1F3B992D-1AB5-B0AB-3BB0-71AD28F835CD}"/>
+              </a:ext>
+            </a:extLst>
+          </p:cNvPr>
+          <p:cNvSpPr>
+            <a:spLocks noGrp="1"/>
+          </p:cNvSpPr>
+          <p:nvPr>
+            <p:ph type="dt" sz="half" idx="10"/>
+          </p:nvPr>
+        </p:nvSpPr>
+        <p:spPr/>
+        <p:txBody>
+          <a:bodyPr/>
+          <a:lstStyle/>
+          <a:p>
+            <a:fld id="{CA3B4C4B-4FCE-684E-BDCF-894303FF802E}" type="datetime1">
+              <a:rPr lang="hu-HU" smtClean="0"/>
+              <a:t>2025. 11. 12.</a:t>
+            </a:fld>
+            <a:endParaRPr lang="hu-HU"/>
+          </a:p>
+        </p:txBody>
+      </p:sp>
+      <p:sp>
+        <p:nvSpPr>
+          <p:cNvPr id="5" name="Dia számának helye 4">
+            <a:extLst>
+              <a:ext uri="{FF2B5EF4-FFF2-40B4-BE49-F238E27FC236}">
+                <a16:creationId xmlns:a16="http://schemas.microsoft.com/office/drawing/2014/main" id="{221768A6-17E9-2E12-197F-2D3C9597F795}"/>
+              </a:ext>
+            </a:extLst>
+          </p:cNvPr>
+          <p:cNvSpPr>
+            <a:spLocks noGrp="1"/>
+          </p:cNvSpPr>
+          <p:nvPr>
+            <p:ph type="sldNum" sz="quarter" idx="12"/>
+          </p:nvPr>
+        </p:nvSpPr>
+        <p:spPr/>
+        <p:txBody>
+          <a:bodyPr/>
+          <a:lstStyle/>
+          <a:p>
+            <a:fld id="{61F88ADF-3301-4598-B089-C6A4CC92BE83}" type="slidenum">
+              <a:rPr lang="hu-HU" smtClean="0"/>
+              <a:t>15</a:t>
+            </a:fld>
+            <a:r>
+              <a:rPr lang="hu-HU" dirty="0"/>
+              <a:t>/22</a:t>
+            </a:r>
+          </a:p>
+        </p:txBody>
+      </p:sp>
+      <p:pic>
+        <p:nvPicPr>
+          <p:cNvPr id="8" name="Tartalom helye 7" descr="A képen szöveg, sor, képernyőkép, diagram látható&#10;&#10;Automatikusan generált leírás">
+            <a:extLst>
+              <a:ext uri="{FF2B5EF4-FFF2-40B4-BE49-F238E27FC236}">
+                <a16:creationId xmlns:a16="http://schemas.microsoft.com/office/drawing/2014/main" id="{A01BC323-3718-5EF4-A148-448EA70B458F}"/>
+              </a:ext>
+            </a:extLst>
+          </p:cNvPr>
+          <p:cNvPicPr>
+            <a:picLocks noGrp="1" noChangeAspect="1"/>
+          </p:cNvPicPr>
+          <p:nvPr>
+            <p:ph idx="1"/>
+          </p:nvPr>
+        </p:nvPicPr>
+        <p:blipFill>
+          <a:blip r:embed="rId3">
+            <a:extLst>
+              <a:ext uri="{28A0092B-C50C-407E-A947-70E740481C1C}">
+                <a14:useLocalDpi xmlns:a14="http://schemas.microsoft.com/office/drawing/2010/main" val="0"/>
+              </a:ext>
+            </a:extLst>
+          </a:blip>
+          <a:stretch>
+            <a:fillRect/>
+          </a:stretch>
+        </p:blipFill>
+        <p:spPr>
+          <a:xfrm>
+            <a:off x="549639" y="1535769"/>
+            <a:ext cx="11092721" cy="4595556"/>
+          </a:xfrm>
+        </p:spPr>
+      </p:pic>
+      <p:pic>
+        <p:nvPicPr>
+          <p:cNvPr id="10" name="Kép 9" descr="A képen szöveg, sor, Diagram, diagram látható&#10;&#10;Automatikusan generált leírás">
+            <a:extLst>
+              <a:ext uri="{FF2B5EF4-FFF2-40B4-BE49-F238E27FC236}">
+                <a16:creationId xmlns:a16="http://schemas.microsoft.com/office/drawing/2014/main" id="{0813B8AB-2885-83F4-56FA-9A06CFC6C887}"/>
+              </a:ext>
+            </a:extLst>
+          </p:cNvPr>
+          <p:cNvPicPr>
+            <a:picLocks noChangeAspect="1"/>
+          </p:cNvPicPr>
+          <p:nvPr/>
+        </p:nvPicPr>
+        <p:blipFill>
+          <a:blip r:embed="rId4">
+            <a:extLst>
+              <a:ext uri="{28A0092B-C50C-407E-A947-70E740481C1C}">
+                <a14:useLocalDpi xmlns:a14="http://schemas.microsoft.com/office/drawing/2010/main" val="0"/>
+              </a:ext>
+            </a:extLst>
+          </a:blip>
+          <a:stretch>
+            <a:fillRect/>
+          </a:stretch>
+        </p:blipFill>
+        <p:spPr>
+          <a:xfrm>
+            <a:off x="549639" y="1535769"/>
+            <a:ext cx="11105379" cy="4600800"/>
+          </a:xfrm>
+          <a:prstGeom prst="rect">
+            <a:avLst/>
+          </a:prstGeom>
+        </p:spPr>
+      </p:pic>
+    </p:spTree>
+    <p:extLst>
+      <p:ext uri="{BB962C8B-B14F-4D97-AF65-F5344CB8AC3E}">
+        <p14:creationId xmlns:p14="http://schemas.microsoft.com/office/powerpoint/2010/main" val="3364227274"/>
       </p:ext>
     </p:extLst>
   </p:cSld>
@@ -8430,918 +9334,6 @@
 </p:sld>
 </file>
 
-<file path=ppt/slides/slide12.xml><?xml version="1.0" encoding="utf-8"?>
-<p:sld xmlns:a="http://schemas.openxmlformats.org/drawingml/2006/main" xmlns:r="http://schemas.openxmlformats.org/officeDocument/2006/relationships" xmlns:p="http://schemas.openxmlformats.org/presentationml/2006/main">
-  <p:cSld>
-    <p:spTree>
-      <p:nvGrpSpPr>
-        <p:cNvPr id="1" name=""/>
-        <p:cNvGrpSpPr/>
-        <p:nvPr/>
-      </p:nvGrpSpPr>
-      <p:grpSpPr>
-        <a:xfrm>
-          <a:off x="0" y="0"/>
-          <a:ext cx="0" cy="0"/>
-          <a:chOff x="0" y="0"/>
-          <a:chExt cx="0" cy="0"/>
-        </a:xfrm>
-      </p:grpSpPr>
-      <p:sp>
-        <p:nvSpPr>
-          <p:cNvPr id="2" name="Cím 1">
-            <a:extLst>
-              <a:ext uri="{FF2B5EF4-FFF2-40B4-BE49-F238E27FC236}">
-                <a16:creationId xmlns:a16="http://schemas.microsoft.com/office/drawing/2014/main" id="{A18C4855-CAF2-5DD9-532A-7A0D88048004}"/>
-              </a:ext>
-            </a:extLst>
-          </p:cNvPr>
-          <p:cNvSpPr>
-            <a:spLocks noGrp="1"/>
-          </p:cNvSpPr>
-          <p:nvPr>
-            <p:ph type="title"/>
-          </p:nvPr>
-        </p:nvSpPr>
-        <p:spPr/>
-        <p:txBody>
-          <a:bodyPr/>
-          <a:lstStyle/>
-          <a:p>
-            <a:r>
-              <a:rPr lang="hu-HU" b="1" dirty="0" err="1"/>
-              <a:t>Klaszterezési</a:t>
-            </a:r>
-            <a:r>
-              <a:rPr lang="hu-HU" b="1" dirty="0"/>
-              <a:t> algoritmusok pontossága</a:t>
-            </a:r>
-            <a:endParaRPr lang="hu-HU" dirty="0"/>
-          </a:p>
-        </p:txBody>
-      </p:sp>
-      <p:sp>
-        <p:nvSpPr>
-          <p:cNvPr id="3" name="Tartalom helye 2">
-            <a:extLst>
-              <a:ext uri="{FF2B5EF4-FFF2-40B4-BE49-F238E27FC236}">
-                <a16:creationId xmlns:a16="http://schemas.microsoft.com/office/drawing/2014/main" id="{DB538570-B920-9406-9988-BB1C0443BDB0}"/>
-              </a:ext>
-            </a:extLst>
-          </p:cNvPr>
-          <p:cNvSpPr>
-            <a:spLocks noGrp="1"/>
-          </p:cNvSpPr>
-          <p:nvPr>
-            <p:ph idx="1"/>
-          </p:nvPr>
-        </p:nvSpPr>
-        <p:spPr/>
-        <p:txBody>
-          <a:bodyPr/>
-          <a:lstStyle/>
-          <a:p>
-            <a:r>
-              <a:rPr lang="hu-HU" dirty="0"/>
-              <a:t>Pontossági mérés beállításai:</a:t>
-            </a:r>
-          </a:p>
-          <a:p>
-            <a:pPr lvl="1"/>
-            <a:r>
-              <a:rPr lang="hu-HU" dirty="0"/>
-              <a:t>Szintetikus adathalmaz:</a:t>
-            </a:r>
-          </a:p>
-          <a:p>
-            <a:pPr lvl="2"/>
-            <a:r>
-              <a:rPr lang="hu-HU" dirty="0"/>
-              <a:t>500 dimenziós vektorok</a:t>
-            </a:r>
-          </a:p>
-          <a:p>
-            <a:pPr lvl="2"/>
-            <a:r>
-              <a:rPr lang="hu-HU" dirty="0"/>
-              <a:t>10.000 adatpont</a:t>
-            </a:r>
-          </a:p>
-          <a:p>
-            <a:pPr lvl="2"/>
-            <a:r>
-              <a:rPr lang="hu-HU" dirty="0"/>
-              <a:t>200, 300, 400, 500, 800 klaszter</a:t>
-            </a:r>
-          </a:p>
-          <a:p>
-            <a:pPr lvl="2"/>
-            <a:r>
-              <a:rPr lang="hu-HU" dirty="0"/>
-              <a:t>Minden klaszterszámra </a:t>
-            </a:r>
-            <a:r>
-              <a:rPr lang="el-GR" dirty="0">
-                <a:solidFill>
-                  <a:srgbClr val="000000"/>
-                </a:solidFill>
-                <a:effectLst/>
-                <a:latin typeface="Times New Roman" panose="02020603050405020304" pitchFamily="18" charset="0"/>
-              </a:rPr>
-              <a:t>σ = 2,</a:t>
-            </a:r>
-            <a:r>
-              <a:rPr lang="hu-HU" dirty="0">
-                <a:solidFill>
-                  <a:srgbClr val="000000"/>
-                </a:solidFill>
-                <a:effectLst/>
-                <a:latin typeface="Times New Roman" panose="02020603050405020304" pitchFamily="18" charset="0"/>
-              </a:rPr>
-              <a:t> </a:t>
-            </a:r>
-            <a:r>
-              <a:rPr lang="el-GR" dirty="0">
-                <a:solidFill>
-                  <a:srgbClr val="000000"/>
-                </a:solidFill>
-                <a:effectLst/>
-                <a:latin typeface="Times New Roman" panose="02020603050405020304" pitchFamily="18" charset="0"/>
-              </a:rPr>
-              <a:t>4, 6, 8 </a:t>
-            </a:r>
-            <a:r>
-              <a:rPr lang="hu-HU" dirty="0">
-                <a:solidFill>
-                  <a:srgbClr val="000000"/>
-                </a:solidFill>
-                <a:effectLst/>
-                <a:latin typeface="Times New Roman" panose="02020603050405020304" pitchFamily="18" charset="0"/>
-              </a:rPr>
-              <a:t>és 10 szórással</a:t>
-            </a:r>
-            <a:endParaRPr lang="hu-HU" dirty="0"/>
-          </a:p>
-          <a:p>
-            <a:pPr lvl="2"/>
-            <a:endParaRPr lang="hu-HU" dirty="0"/>
-          </a:p>
-        </p:txBody>
-      </p:sp>
-      <p:sp>
-        <p:nvSpPr>
-          <p:cNvPr id="4" name="Dátum helye 3">
-            <a:extLst>
-              <a:ext uri="{FF2B5EF4-FFF2-40B4-BE49-F238E27FC236}">
-                <a16:creationId xmlns:a16="http://schemas.microsoft.com/office/drawing/2014/main" id="{97B084F8-7887-3ADC-D4D8-A26425144373}"/>
-              </a:ext>
-            </a:extLst>
-          </p:cNvPr>
-          <p:cNvSpPr>
-            <a:spLocks noGrp="1"/>
-          </p:cNvSpPr>
-          <p:nvPr>
-            <p:ph type="dt" sz="half" idx="10"/>
-          </p:nvPr>
-        </p:nvSpPr>
-        <p:spPr/>
-        <p:txBody>
-          <a:bodyPr/>
-          <a:lstStyle/>
-          <a:p>
-            <a:fld id="{F5CF19C3-C554-0D49-858F-BC5A4F8BAF23}" type="datetime1">
-              <a:rPr lang="hu-HU" smtClean="0"/>
-              <a:t>2025. 11. 11.</a:t>
-            </a:fld>
-            <a:endParaRPr lang="hu-HU"/>
-          </a:p>
-        </p:txBody>
-      </p:sp>
-      <p:sp>
-        <p:nvSpPr>
-          <p:cNvPr id="5" name="Dia számának helye 4">
-            <a:extLst>
-              <a:ext uri="{FF2B5EF4-FFF2-40B4-BE49-F238E27FC236}">
-                <a16:creationId xmlns:a16="http://schemas.microsoft.com/office/drawing/2014/main" id="{C49B74D0-CF8E-A658-AA33-4DF54D917350}"/>
-              </a:ext>
-            </a:extLst>
-          </p:cNvPr>
-          <p:cNvSpPr>
-            <a:spLocks noGrp="1"/>
-          </p:cNvSpPr>
-          <p:nvPr>
-            <p:ph type="sldNum" sz="quarter" idx="12"/>
-          </p:nvPr>
-        </p:nvSpPr>
-        <p:spPr/>
-        <p:txBody>
-          <a:bodyPr/>
-          <a:lstStyle/>
-          <a:p>
-            <a:fld id="{61F88ADF-3301-4598-B089-C6A4CC92BE83}" type="slidenum">
-              <a:rPr lang="hu-HU" smtClean="0"/>
-              <a:t>12</a:t>
-            </a:fld>
-            <a:r>
-              <a:rPr lang="hu-HU" dirty="0"/>
-              <a:t>/22</a:t>
-            </a:r>
-          </a:p>
-        </p:txBody>
-      </p:sp>
-    </p:spTree>
-    <p:extLst>
-      <p:ext uri="{BB962C8B-B14F-4D97-AF65-F5344CB8AC3E}">
-        <p14:creationId xmlns:p14="http://schemas.microsoft.com/office/powerpoint/2010/main" val="1625220533"/>
-      </p:ext>
-    </p:extLst>
-  </p:cSld>
-  <p:clrMapOvr>
-    <a:masterClrMapping/>
-  </p:clrMapOvr>
-</p:sld>
-</file>
-
-<file path=ppt/slides/slide13.xml><?xml version="1.0" encoding="utf-8"?>
-<p:sld xmlns:a="http://schemas.openxmlformats.org/drawingml/2006/main" xmlns:r="http://schemas.openxmlformats.org/officeDocument/2006/relationships" xmlns:p="http://schemas.openxmlformats.org/presentationml/2006/main">
-  <p:cSld>
-    <p:spTree>
-      <p:nvGrpSpPr>
-        <p:cNvPr id="1" name=""/>
-        <p:cNvGrpSpPr/>
-        <p:nvPr/>
-      </p:nvGrpSpPr>
-      <p:grpSpPr>
-        <a:xfrm>
-          <a:off x="0" y="0"/>
-          <a:ext cx="0" cy="0"/>
-          <a:chOff x="0" y="0"/>
-          <a:chExt cx="0" cy="0"/>
-        </a:xfrm>
-      </p:grpSpPr>
-      <p:sp>
-        <p:nvSpPr>
-          <p:cNvPr id="2" name="Cím 1">
-            <a:extLst>
-              <a:ext uri="{FF2B5EF4-FFF2-40B4-BE49-F238E27FC236}">
-                <a16:creationId xmlns:a16="http://schemas.microsoft.com/office/drawing/2014/main" id="{55C9B2F7-33BF-5C12-61DB-2CD68A814566}"/>
-              </a:ext>
-            </a:extLst>
-          </p:cNvPr>
-          <p:cNvSpPr>
-            <a:spLocks noGrp="1"/>
-          </p:cNvSpPr>
-          <p:nvPr>
-            <p:ph type="title"/>
-          </p:nvPr>
-        </p:nvSpPr>
-        <p:spPr/>
-        <p:txBody>
-          <a:bodyPr/>
-          <a:lstStyle/>
-          <a:p>
-            <a:r>
-              <a:rPr lang="hu-HU" b="1" dirty="0"/>
-              <a:t>Pontossági eredmények (ARI és NMI)</a:t>
-            </a:r>
-          </a:p>
-        </p:txBody>
-      </p:sp>
-      <p:sp>
-        <p:nvSpPr>
-          <p:cNvPr id="4" name="Dátum helye 3">
-            <a:extLst>
-              <a:ext uri="{FF2B5EF4-FFF2-40B4-BE49-F238E27FC236}">
-                <a16:creationId xmlns:a16="http://schemas.microsoft.com/office/drawing/2014/main" id="{C638CB8B-7386-89C9-3034-99523D920BE2}"/>
-              </a:ext>
-            </a:extLst>
-          </p:cNvPr>
-          <p:cNvSpPr>
-            <a:spLocks noGrp="1"/>
-          </p:cNvSpPr>
-          <p:nvPr>
-            <p:ph type="dt" sz="half" idx="10"/>
-          </p:nvPr>
-        </p:nvSpPr>
-        <p:spPr/>
-        <p:txBody>
-          <a:bodyPr/>
-          <a:lstStyle/>
-          <a:p>
-            <a:fld id="{86D7C4ED-070D-D147-BEC5-7EAE588D72B2}" type="datetime1">
-              <a:rPr lang="hu-HU" smtClean="0"/>
-              <a:t>2025. 11. 11.</a:t>
-            </a:fld>
-            <a:endParaRPr lang="hu-HU"/>
-          </a:p>
-        </p:txBody>
-      </p:sp>
-      <p:sp>
-        <p:nvSpPr>
-          <p:cNvPr id="5" name="Dia számának helye 4">
-            <a:extLst>
-              <a:ext uri="{FF2B5EF4-FFF2-40B4-BE49-F238E27FC236}">
-                <a16:creationId xmlns:a16="http://schemas.microsoft.com/office/drawing/2014/main" id="{E8C09457-CD5D-D0C2-3D41-F3729923EA9F}"/>
-              </a:ext>
-            </a:extLst>
-          </p:cNvPr>
-          <p:cNvSpPr>
-            <a:spLocks noGrp="1"/>
-          </p:cNvSpPr>
-          <p:nvPr>
-            <p:ph type="sldNum" sz="quarter" idx="12"/>
-          </p:nvPr>
-        </p:nvSpPr>
-        <p:spPr/>
-        <p:txBody>
-          <a:bodyPr/>
-          <a:lstStyle/>
-          <a:p>
-            <a:fld id="{61F88ADF-3301-4598-B089-C6A4CC92BE83}" type="slidenum">
-              <a:rPr lang="hu-HU" smtClean="0"/>
-              <a:t>13</a:t>
-            </a:fld>
-            <a:r>
-              <a:rPr lang="hu-HU" dirty="0"/>
-              <a:t>/22</a:t>
-            </a:r>
-          </a:p>
-        </p:txBody>
-      </p:sp>
-      <p:pic>
-        <p:nvPicPr>
-          <p:cNvPr id="11" name="Tartalom helye 10">
-            <a:extLst>
-              <a:ext uri="{FF2B5EF4-FFF2-40B4-BE49-F238E27FC236}">
-                <a16:creationId xmlns:a16="http://schemas.microsoft.com/office/drawing/2014/main" id="{5F12DD7E-7C79-6A85-74B8-A3082BAE07F6}"/>
-              </a:ext>
-            </a:extLst>
-          </p:cNvPr>
-          <p:cNvPicPr>
-            <a:picLocks noGrp="1" noChangeAspect="1"/>
-          </p:cNvPicPr>
-          <p:nvPr>
-            <p:ph idx="1"/>
-          </p:nvPr>
-        </p:nvPicPr>
-        <p:blipFill>
-          <a:blip r:embed="rId3">
-            <a:extLst>
-              <a:ext uri="{28A0092B-C50C-407E-A947-70E740481C1C}">
-                <a14:useLocalDpi xmlns:a14="http://schemas.microsoft.com/office/drawing/2010/main" val="0"/>
-              </a:ext>
-            </a:extLst>
-          </a:blip>
-          <a:stretch>
-            <a:fillRect/>
-          </a:stretch>
-        </p:blipFill>
-        <p:spPr>
-          <a:xfrm>
-            <a:off x="1528665" y="1455477"/>
-            <a:ext cx="9134669" cy="4679006"/>
-          </a:xfrm>
-        </p:spPr>
-      </p:pic>
-    </p:spTree>
-    <p:extLst>
-      <p:ext uri="{BB962C8B-B14F-4D97-AF65-F5344CB8AC3E}">
-        <p14:creationId xmlns:p14="http://schemas.microsoft.com/office/powerpoint/2010/main" val="290535503"/>
-      </p:ext>
-    </p:extLst>
-  </p:cSld>
-  <p:clrMapOvr>
-    <a:masterClrMapping/>
-  </p:clrMapOvr>
-</p:sld>
-</file>
-
-<file path=ppt/slides/slide14.xml><?xml version="1.0" encoding="utf-8"?>
-<p:sld xmlns:a="http://schemas.openxmlformats.org/drawingml/2006/main" xmlns:r="http://schemas.openxmlformats.org/officeDocument/2006/relationships" xmlns:p="http://schemas.openxmlformats.org/presentationml/2006/main">
-  <p:cSld>
-    <p:spTree>
-      <p:nvGrpSpPr>
-        <p:cNvPr id="1" name=""/>
-        <p:cNvGrpSpPr/>
-        <p:nvPr/>
-      </p:nvGrpSpPr>
-      <p:grpSpPr>
-        <a:xfrm>
-          <a:off x="0" y="0"/>
-          <a:ext cx="0" cy="0"/>
-          <a:chOff x="0" y="0"/>
-          <a:chExt cx="0" cy="0"/>
-        </a:xfrm>
-      </p:grpSpPr>
-      <p:sp>
-        <p:nvSpPr>
-          <p:cNvPr id="2" name="Cím 1">
-            <a:extLst>
-              <a:ext uri="{FF2B5EF4-FFF2-40B4-BE49-F238E27FC236}">
-                <a16:creationId xmlns:a16="http://schemas.microsoft.com/office/drawing/2014/main" id="{B16C46A4-6D8D-D412-17FC-B034421735DF}"/>
-              </a:ext>
-            </a:extLst>
-          </p:cNvPr>
-          <p:cNvSpPr>
-            <a:spLocks noGrp="1"/>
-          </p:cNvSpPr>
-          <p:nvPr>
-            <p:ph type="title"/>
-          </p:nvPr>
-        </p:nvSpPr>
-        <p:spPr/>
-        <p:txBody>
-          <a:bodyPr>
-            <a:normAutofit/>
-          </a:bodyPr>
-          <a:lstStyle/>
-          <a:p>
-            <a:r>
-              <a:rPr lang="hu-HU" sz="4000" b="1" dirty="0"/>
-              <a:t>A visszakeresési folyamat (</a:t>
-            </a:r>
-            <a:r>
-              <a:rPr lang="hu-HU" sz="4000" b="1" dirty="0" err="1"/>
-              <a:t>retrieval</a:t>
-            </a:r>
-            <a:r>
-              <a:rPr lang="hu-HU" sz="4000" b="1" dirty="0"/>
-              <a:t> </a:t>
-            </a:r>
-            <a:r>
-              <a:rPr lang="hu-HU" sz="4000" b="1" dirty="0" err="1"/>
-              <a:t>pipeline</a:t>
-            </a:r>
-            <a:r>
-              <a:rPr lang="hu-HU" sz="4000" b="1" dirty="0"/>
-              <a:t>) kiértékelése</a:t>
-            </a:r>
-          </a:p>
-        </p:txBody>
-      </p:sp>
-      <p:sp>
-        <p:nvSpPr>
-          <p:cNvPr id="3" name="Tartalom helye 2">
-            <a:extLst>
-              <a:ext uri="{FF2B5EF4-FFF2-40B4-BE49-F238E27FC236}">
-                <a16:creationId xmlns:a16="http://schemas.microsoft.com/office/drawing/2014/main" id="{689235CC-06AC-C5E8-688B-C1936A5D3FD3}"/>
-              </a:ext>
-            </a:extLst>
-          </p:cNvPr>
-          <p:cNvSpPr>
-            <a:spLocks noGrp="1"/>
-          </p:cNvSpPr>
-          <p:nvPr>
-            <p:ph idx="1"/>
-          </p:nvPr>
-        </p:nvSpPr>
-        <p:spPr>
-          <a:xfrm>
-            <a:off x="838200" y="2141537"/>
-            <a:ext cx="10515600" cy="4351338"/>
-          </a:xfrm>
-        </p:spPr>
-        <p:txBody>
-          <a:bodyPr/>
-          <a:lstStyle/>
-          <a:p>
-            <a:r>
-              <a:rPr lang="hu-HU" dirty="0"/>
-              <a:t>A mérés beállításai:</a:t>
-            </a:r>
-          </a:p>
-          <a:p>
-            <a:pPr lvl="1"/>
-            <a:r>
-              <a:rPr lang="hu-HU" dirty="0"/>
-              <a:t>Cél: Minden </a:t>
-            </a:r>
-            <a:r>
-              <a:rPr lang="hu-HU" dirty="0" err="1"/>
-              <a:t>query-hez</a:t>
-            </a:r>
-            <a:r>
-              <a:rPr lang="hu-HU" dirty="0"/>
-              <a:t> (87.599) megtalálni a legrelevánsabb </a:t>
-            </a:r>
-            <a:r>
-              <a:rPr lang="hu-HU" dirty="0" err="1"/>
-              <a:t>embedding</a:t>
-            </a:r>
-            <a:r>
-              <a:rPr lang="hu-HU" dirty="0"/>
-              <a:t> vektort</a:t>
-            </a:r>
-          </a:p>
-          <a:p>
-            <a:pPr lvl="1"/>
-            <a:r>
-              <a:rPr lang="hu-HU" dirty="0"/>
-              <a:t>Kérdések 15%-ára nincs válasz</a:t>
-            </a:r>
-          </a:p>
-          <a:p>
-            <a:pPr lvl="1"/>
-            <a:r>
-              <a:rPr lang="hu-HU" dirty="0"/>
-              <a:t>Ha a hasonlóság kisebb, mint 0,6            Nincs válasz a kérdésre</a:t>
-            </a:r>
-          </a:p>
-        </p:txBody>
-      </p:sp>
-      <p:sp>
-        <p:nvSpPr>
-          <p:cNvPr id="4" name="Dátum helye 3">
-            <a:extLst>
-              <a:ext uri="{FF2B5EF4-FFF2-40B4-BE49-F238E27FC236}">
-                <a16:creationId xmlns:a16="http://schemas.microsoft.com/office/drawing/2014/main" id="{720F0211-477B-15E0-2EBF-2A47A202C6E1}"/>
-              </a:ext>
-            </a:extLst>
-          </p:cNvPr>
-          <p:cNvSpPr>
-            <a:spLocks noGrp="1"/>
-          </p:cNvSpPr>
-          <p:nvPr>
-            <p:ph type="dt" sz="half" idx="10"/>
-          </p:nvPr>
-        </p:nvSpPr>
-        <p:spPr/>
-        <p:txBody>
-          <a:bodyPr/>
-          <a:lstStyle/>
-          <a:p>
-            <a:fld id="{DB103250-059E-6C49-9AEC-D7E11F74EA17}" type="datetime1">
-              <a:rPr lang="hu-HU" smtClean="0"/>
-              <a:t>2025. 11. 11.</a:t>
-            </a:fld>
-            <a:endParaRPr lang="hu-HU"/>
-          </a:p>
-        </p:txBody>
-      </p:sp>
-      <p:sp>
-        <p:nvSpPr>
-          <p:cNvPr id="5" name="Dia számának helye 4">
-            <a:extLst>
-              <a:ext uri="{FF2B5EF4-FFF2-40B4-BE49-F238E27FC236}">
-                <a16:creationId xmlns:a16="http://schemas.microsoft.com/office/drawing/2014/main" id="{BB189B6E-7E3F-3280-6C58-EF7283E05090}"/>
-              </a:ext>
-            </a:extLst>
-          </p:cNvPr>
-          <p:cNvSpPr>
-            <a:spLocks noGrp="1"/>
-          </p:cNvSpPr>
-          <p:nvPr>
-            <p:ph type="sldNum" sz="quarter" idx="12"/>
-          </p:nvPr>
-        </p:nvSpPr>
-        <p:spPr/>
-        <p:txBody>
-          <a:bodyPr/>
-          <a:lstStyle/>
-          <a:p>
-            <a:fld id="{61F88ADF-3301-4598-B089-C6A4CC92BE83}" type="slidenum">
-              <a:rPr lang="hu-HU" smtClean="0"/>
-              <a:t>14</a:t>
-            </a:fld>
-            <a:r>
-              <a:rPr lang="hu-HU" dirty="0"/>
-              <a:t>/22</a:t>
-            </a:r>
-          </a:p>
-        </p:txBody>
-      </p:sp>
-      <p:pic>
-        <p:nvPicPr>
-          <p:cNvPr id="7" name="Ábra 6" descr="Jobbra mutató nyíl egyszínű kitöltéssel">
-            <a:extLst>
-              <a:ext uri="{FF2B5EF4-FFF2-40B4-BE49-F238E27FC236}">
-                <a16:creationId xmlns:a16="http://schemas.microsoft.com/office/drawing/2014/main" id="{7120109B-EAC2-F9F6-35EF-CAAE89E34173}"/>
-              </a:ext>
-            </a:extLst>
-          </p:cNvPr>
-          <p:cNvPicPr>
-            <a:picLocks noChangeAspect="1"/>
-          </p:cNvPicPr>
-          <p:nvPr/>
-        </p:nvPicPr>
-        <p:blipFill>
-          <a:blip r:embed="rId3">
-            <a:extLst>
-              <a:ext uri="{96DAC541-7B7A-43D3-8B79-37D633B846F1}">
-                <asvg:svgBlip xmlns:asvg="http://schemas.microsoft.com/office/drawing/2016/SVG/main" r:embed="rId4"/>
-              </a:ext>
-            </a:extLst>
-          </a:blip>
-          <a:stretch>
-            <a:fillRect/>
-          </a:stretch>
-        </p:blipFill>
-        <p:spPr>
-          <a:xfrm>
-            <a:off x="6096000" y="3652052"/>
-            <a:ext cx="467031" cy="511712"/>
-          </a:xfrm>
-          <a:prstGeom prst="rect">
-            <a:avLst/>
-          </a:prstGeom>
-        </p:spPr>
-      </p:pic>
-    </p:spTree>
-    <p:extLst>
-      <p:ext uri="{BB962C8B-B14F-4D97-AF65-F5344CB8AC3E}">
-        <p14:creationId xmlns:p14="http://schemas.microsoft.com/office/powerpoint/2010/main" val="2554584894"/>
-      </p:ext>
-    </p:extLst>
-  </p:cSld>
-  <p:clrMapOvr>
-    <a:masterClrMapping/>
-  </p:clrMapOvr>
-</p:sld>
-</file>
-
-<file path=ppt/slides/slide15.xml><?xml version="1.0" encoding="utf-8"?>
-<p:sld xmlns:a="http://schemas.openxmlformats.org/drawingml/2006/main" xmlns:r="http://schemas.openxmlformats.org/officeDocument/2006/relationships" xmlns:p="http://schemas.openxmlformats.org/presentationml/2006/main">
-  <p:cSld>
-    <p:spTree>
-      <p:nvGrpSpPr>
-        <p:cNvPr id="1" name=""/>
-        <p:cNvGrpSpPr/>
-        <p:nvPr/>
-      </p:nvGrpSpPr>
-      <p:grpSpPr>
-        <a:xfrm>
-          <a:off x="0" y="0"/>
-          <a:ext cx="0" cy="0"/>
-          <a:chOff x="0" y="0"/>
-          <a:chExt cx="0" cy="0"/>
-        </a:xfrm>
-      </p:grpSpPr>
-      <p:sp>
-        <p:nvSpPr>
-          <p:cNvPr id="2" name="Cím 1">
-            <a:extLst>
-              <a:ext uri="{FF2B5EF4-FFF2-40B4-BE49-F238E27FC236}">
-                <a16:creationId xmlns:a16="http://schemas.microsoft.com/office/drawing/2014/main" id="{8D9D9E66-EAAD-305B-FE2A-DC7CD4764041}"/>
-              </a:ext>
-            </a:extLst>
-          </p:cNvPr>
-          <p:cNvSpPr>
-            <a:spLocks noGrp="1"/>
-          </p:cNvSpPr>
-          <p:nvPr>
-            <p:ph type="title"/>
-          </p:nvPr>
-        </p:nvSpPr>
-        <p:spPr/>
-        <p:txBody>
-          <a:bodyPr>
-            <a:normAutofit/>
-          </a:bodyPr>
-          <a:lstStyle/>
-          <a:p>
-            <a:r>
-              <a:rPr lang="hu-HU" sz="4000" b="1" dirty="0"/>
-              <a:t>A visszakeresési folyamat (</a:t>
-            </a:r>
-            <a:r>
-              <a:rPr lang="hu-HU" sz="4000" b="1" dirty="0" err="1"/>
-              <a:t>retrieval</a:t>
-            </a:r>
-            <a:r>
-              <a:rPr lang="hu-HU" sz="4000" b="1" dirty="0"/>
-              <a:t> </a:t>
-            </a:r>
-            <a:r>
-              <a:rPr lang="hu-HU" sz="4000" b="1" dirty="0" err="1"/>
-              <a:t>pipeline</a:t>
-            </a:r>
-            <a:r>
-              <a:rPr lang="hu-HU" sz="4000" b="1" dirty="0"/>
-              <a:t>) kiértékelése</a:t>
-            </a:r>
-          </a:p>
-        </p:txBody>
-      </p:sp>
-      <p:sp>
-        <p:nvSpPr>
-          <p:cNvPr id="4" name="Dátum helye 3">
-            <a:extLst>
-              <a:ext uri="{FF2B5EF4-FFF2-40B4-BE49-F238E27FC236}">
-                <a16:creationId xmlns:a16="http://schemas.microsoft.com/office/drawing/2014/main" id="{1F3B992D-1AB5-B0AB-3BB0-71AD28F835CD}"/>
-              </a:ext>
-            </a:extLst>
-          </p:cNvPr>
-          <p:cNvSpPr>
-            <a:spLocks noGrp="1"/>
-          </p:cNvSpPr>
-          <p:nvPr>
-            <p:ph type="dt" sz="half" idx="10"/>
-          </p:nvPr>
-        </p:nvSpPr>
-        <p:spPr/>
-        <p:txBody>
-          <a:bodyPr/>
-          <a:lstStyle/>
-          <a:p>
-            <a:fld id="{CA3B4C4B-4FCE-684E-BDCF-894303FF802E}" type="datetime1">
-              <a:rPr lang="hu-HU" smtClean="0"/>
-              <a:t>2025. 11. 11.</a:t>
-            </a:fld>
-            <a:endParaRPr lang="hu-HU"/>
-          </a:p>
-        </p:txBody>
-      </p:sp>
-      <p:sp>
-        <p:nvSpPr>
-          <p:cNvPr id="5" name="Dia számának helye 4">
-            <a:extLst>
-              <a:ext uri="{FF2B5EF4-FFF2-40B4-BE49-F238E27FC236}">
-                <a16:creationId xmlns:a16="http://schemas.microsoft.com/office/drawing/2014/main" id="{221768A6-17E9-2E12-197F-2D3C9597F795}"/>
-              </a:ext>
-            </a:extLst>
-          </p:cNvPr>
-          <p:cNvSpPr>
-            <a:spLocks noGrp="1"/>
-          </p:cNvSpPr>
-          <p:nvPr>
-            <p:ph type="sldNum" sz="quarter" idx="12"/>
-          </p:nvPr>
-        </p:nvSpPr>
-        <p:spPr/>
-        <p:txBody>
-          <a:bodyPr/>
-          <a:lstStyle/>
-          <a:p>
-            <a:fld id="{61F88ADF-3301-4598-B089-C6A4CC92BE83}" type="slidenum">
-              <a:rPr lang="hu-HU" smtClean="0"/>
-              <a:t>15</a:t>
-            </a:fld>
-            <a:r>
-              <a:rPr lang="hu-HU" dirty="0"/>
-              <a:t>/22</a:t>
-            </a:r>
-          </a:p>
-        </p:txBody>
-      </p:sp>
-      <p:pic>
-        <p:nvPicPr>
-          <p:cNvPr id="13" name="Tartalom helye 12" descr="A képen szöveg, sor, diagram, képernyőkép látható&#10;&#10;Automatikusan generált leírás">
-            <a:extLst>
-              <a:ext uri="{FF2B5EF4-FFF2-40B4-BE49-F238E27FC236}">
-                <a16:creationId xmlns:a16="http://schemas.microsoft.com/office/drawing/2014/main" id="{F25E98A0-C7E0-6A89-57CF-A916F2E38DDC}"/>
-              </a:ext>
-            </a:extLst>
-          </p:cNvPr>
-          <p:cNvPicPr>
-            <a:picLocks noGrp="1" noChangeAspect="1"/>
-          </p:cNvPicPr>
-          <p:nvPr>
-            <p:ph idx="1"/>
-          </p:nvPr>
-        </p:nvPicPr>
-        <p:blipFill>
-          <a:blip r:embed="rId3">
-            <a:extLst>
-              <a:ext uri="{28A0092B-C50C-407E-A947-70E740481C1C}">
-                <a14:useLocalDpi xmlns:a14="http://schemas.microsoft.com/office/drawing/2010/main" val="0"/>
-              </a:ext>
-            </a:extLst>
-          </a:blip>
-          <a:stretch>
-            <a:fillRect/>
-          </a:stretch>
-        </p:blipFill>
-        <p:spPr>
-          <a:xfrm>
-            <a:off x="447721" y="1676350"/>
-            <a:ext cx="11296557" cy="4680000"/>
-          </a:xfrm>
-        </p:spPr>
-      </p:pic>
-      <p:pic>
-        <p:nvPicPr>
-          <p:cNvPr id="16" name="Kép 15" descr="A képen szöveg, sor, Diagram, diagram látható&#10;&#10;Automatikusan generált leírás">
-            <a:extLst>
-              <a:ext uri="{FF2B5EF4-FFF2-40B4-BE49-F238E27FC236}">
-                <a16:creationId xmlns:a16="http://schemas.microsoft.com/office/drawing/2014/main" id="{4D3C8CA0-7AB4-A3A2-A64C-2B4A94C2BBF4}"/>
-              </a:ext>
-            </a:extLst>
-          </p:cNvPr>
-          <p:cNvPicPr>
-            <a:picLocks noChangeAspect="1"/>
-          </p:cNvPicPr>
-          <p:nvPr/>
-        </p:nvPicPr>
-        <p:blipFill>
-          <a:blip r:embed="rId4">
-            <a:extLst>
-              <a:ext uri="{28A0092B-C50C-407E-A947-70E740481C1C}">
-                <a14:useLocalDpi xmlns:a14="http://schemas.microsoft.com/office/drawing/2010/main" val="0"/>
-              </a:ext>
-            </a:extLst>
-          </a:blip>
-          <a:stretch>
-            <a:fillRect/>
-          </a:stretch>
-        </p:blipFill>
-        <p:spPr>
-          <a:xfrm>
-            <a:off x="447725" y="1690688"/>
-            <a:ext cx="11296553" cy="4680000"/>
-          </a:xfrm>
-          <a:prstGeom prst="rect">
-            <a:avLst/>
-          </a:prstGeom>
-        </p:spPr>
-      </p:pic>
-    </p:spTree>
-    <p:extLst>
-      <p:ext uri="{BB962C8B-B14F-4D97-AF65-F5344CB8AC3E}">
-        <p14:creationId xmlns:p14="http://schemas.microsoft.com/office/powerpoint/2010/main" val="3364227274"/>
-      </p:ext>
-    </p:extLst>
-  </p:cSld>
-  <p:clrMapOvr>
-    <a:masterClrMapping/>
-  </p:clrMapOvr>
-  <p:timing>
-    <p:tnLst>
-      <p:par>
-        <p:cTn id="1" dur="indefinite" restart="never" nodeType="tmRoot">
-          <p:childTnLst>
-            <p:seq concurrent="1" nextAc="seek">
-              <p:cTn id="2" dur="indefinite" nodeType="mainSeq">
-                <p:childTnLst>
-                  <p:par>
-                    <p:cTn id="3" fill="hold">
-                      <p:stCondLst>
-                        <p:cond delay="indefinite"/>
-                      </p:stCondLst>
-                      <p:childTnLst>
-                        <p:par>
-                          <p:cTn id="4" fill="hold">
-                            <p:stCondLst>
-                              <p:cond delay="0"/>
-                            </p:stCondLst>
-                            <p:childTnLst>
-                              <p:par>
-                                <p:cTn id="5" presetID="1" presetClass="entr" presetSubtype="0" fill="hold" nodeType="clickEffect">
-                                  <p:stCondLst>
-                                    <p:cond delay="0"/>
-                                  </p:stCondLst>
-                                  <p:childTnLst>
-                                    <p:set>
-                                      <p:cBhvr>
-                                        <p:cTn id="6" dur="1" fill="hold">
-                                          <p:stCondLst>
-                                            <p:cond delay="0"/>
-                                          </p:stCondLst>
-                                        </p:cTn>
-                                        <p:tgtEl>
-                                          <p:spTgt spid="16"/>
-                                        </p:tgtEl>
-                                        <p:attrNameLst>
-                                          <p:attrName>style.visibility</p:attrName>
-                                        </p:attrNameLst>
-                                      </p:cBhvr>
-                                      <p:to>
-                                        <p:strVal val="visible"/>
-                                      </p:to>
-                                    </p:set>
-                                  </p:childTnLst>
-                                </p:cTn>
-                              </p:par>
-                            </p:childTnLst>
-                          </p:cTn>
-                        </p:par>
-                      </p:childTnLst>
-                    </p:cTn>
-                  </p:par>
-                </p:childTnLst>
-              </p:cTn>
-              <p:prevCondLst>
-                <p:cond evt="onPrev" delay="0">
-                  <p:tgtEl>
-                    <p:sldTgt/>
-                  </p:tgtEl>
-                </p:cond>
-              </p:prevCondLst>
-              <p:nextCondLst>
-                <p:cond evt="onNext" delay="0">
-                  <p:tgtEl>
-                    <p:sldTgt/>
-                  </p:tgtEl>
-                </p:cond>
-              </p:nextCondLst>
-            </p:seq>
-          </p:childTnLst>
-        </p:cTn>
-      </p:par>
-    </p:tnLst>
-  </p:timing>
-</p:sld>
-</file>
-
 <file path=ppt/slides/slide16.xml><?xml version="1.0" encoding="utf-8"?>
 <p:sld xmlns:a="http://schemas.openxmlformats.org/drawingml/2006/main" xmlns:r="http://schemas.openxmlformats.org/officeDocument/2006/relationships" xmlns:p="http://schemas.openxmlformats.org/presentationml/2006/main">
   <p:cSld>
@@ -9466,7 +9458,7 @@
           <a:p>
             <a:fld id="{A1F67968-9289-324A-8185-9F1024D0E0BB}" type="datetime1">
               <a:rPr lang="hu-HU" smtClean="0"/>
-              <a:t>2025. 11. 11.</a:t>
+              <a:t>2025. 11. 12.</a:t>
             </a:fld>
             <a:endParaRPr lang="hu-HU"/>
           </a:p>
@@ -9587,7 +9579,7 @@
           <a:p>
             <a:fld id="{C19EC71B-C64D-AC47-B57B-94F3463CBF7C}" type="datetime1">
               <a:rPr lang="hu-HU" smtClean="0"/>
-              <a:t>2025. 11. 11.</a:t>
+              <a:t>2025. 11. 12.</a:t>
             </a:fld>
             <a:endParaRPr lang="hu-HU"/>
           </a:p>
@@ -9876,7 +9868,7 @@
           <a:p>
             <a:fld id="{9B9C5130-88B4-B04A-A570-CDDCA513217F}" type="datetime1">
               <a:rPr lang="hu-HU" smtClean="0"/>
-              <a:t>2025. 11. 11.</a:t>
+              <a:t>2025. 11. 12.</a:t>
             </a:fld>
             <a:endParaRPr lang="hu-HU"/>
           </a:p>
@@ -10143,7 +10135,7 @@
           <a:p>
             <a:fld id="{C6ADFBD6-396A-C74B-847F-F81995866E7F}" type="datetime1">
               <a:rPr lang="hu-HU" smtClean="0"/>
-              <a:t>2025. 11. 11.</a:t>
+              <a:t>2025. 11. 12.</a:t>
             </a:fld>
             <a:endParaRPr lang="hu-HU"/>
           </a:p>
@@ -10799,7 +10791,7 @@
           <a:p>
             <a:fld id="{D3B9E4F3-2471-F946-A10E-F965F7F15FF3}" type="datetime1">
               <a:rPr lang="hu-HU" smtClean="0"/>
-              <a:t>2025. 11. 11.</a:t>
+              <a:t>2025. 11. 12.</a:t>
             </a:fld>
             <a:endParaRPr lang="hu-HU"/>
           </a:p>
@@ -11781,7 +11773,7 @@
             </a:pPr>
             <a:fld id="{29D8A9DB-A63D-1E43-964A-FEA6F241DBC6}" type="datetime1">
               <a:rPr lang="hu-HU" smtClean="0"/>
-              <a:t>2025. 11. 11.</a:t>
+              <a:t>2025. 11. 12.</a:t>
             </a:fld>
             <a:endParaRPr lang="hu-HU"/>
           </a:p>
@@ -13932,7 +13924,7 @@
           <a:p>
             <a:fld id="{9A3D4093-34E7-DB4F-8E21-29319E040103}" type="datetime1">
               <a:rPr lang="hu-HU" smtClean="0"/>
-              <a:t>2025. 11. 11.</a:t>
+              <a:t>2025. 11. 12.</a:t>
             </a:fld>
             <a:endParaRPr lang="hu-HU"/>
           </a:p>
@@ -14547,7 +14539,7 @@
           <a:p>
             <a:fld id="{EDCD7766-E8FF-F045-B46B-9108152DAA94}" type="datetime1">
               <a:rPr lang="hu-HU" smtClean="0"/>
-              <a:t>2025. 11. 11.</a:t>
+              <a:t>2025. 11. 12.</a:t>
             </a:fld>
             <a:endParaRPr lang="hu-HU"/>
           </a:p>
@@ -14767,7 +14759,7 @@
           <a:p>
             <a:fld id="{77E87468-36DB-7F46-920C-0F19CC9A9134}" type="datetime1">
               <a:rPr lang="hu-HU" smtClean="0"/>
-              <a:t>2025. 11. 11.</a:t>
+              <a:t>2025. 11. 12.</a:t>
             </a:fld>
             <a:endParaRPr lang="hu-HU"/>
           </a:p>
@@ -15783,7 +15775,7 @@
             </a:pPr>
             <a:fld id="{D24C2032-E76D-2848-BAF7-0E597B598D68}" type="datetime1">
               <a:rPr lang="hu-HU" smtClean="0"/>
-              <a:t>2025. 11. 11.</a:t>
+              <a:t>2025. 11. 12.</a:t>
             </a:fld>
             <a:endParaRPr lang="hu-HU"/>
           </a:p>
@@ -16431,7 +16423,7 @@
                   </a:schemeClr>
                 </a:solidFill>
               </a:rPr>
-              <a:t>2025. 11. 11.</a:t>
+              <a:t>2025. 11. 12.</a:t>
             </a:fld>
             <a:endParaRPr lang="en-US" dirty="0">
               <a:solidFill>
@@ -17166,7 +17158,7 @@
             </a:pPr>
             <a:fld id="{05B90B19-A1FC-5745-9E3E-9A58B2658B29}" type="datetime1">
               <a:rPr lang="hu-HU" smtClean="0"/>
-              <a:t>2025. 11. 11.</a:t>
+              <a:t>2025. 11. 12.</a:t>
             </a:fld>
             <a:endParaRPr lang="hu-HU"/>
           </a:p>
@@ -17353,7 +17345,7 @@
           <a:p>
             <a:fld id="{78DF9215-F87C-794D-9DB3-DA814D7D6B51}" type="datetime1">
               <a:rPr lang="hu-HU" smtClean="0"/>
-              <a:t>2025. 11. 11.</a:t>
+              <a:t>2025. 11. 12.</a:t>
             </a:fld>
             <a:endParaRPr lang="hu-HU"/>
           </a:p>

</xml_diff>